<commit_message>
Worked on experiment section
</commit_message>
<xml_diff>
--- a/papers/RSS2016/pictures/pdf/IntroSwarmPic.pptx
+++ b/papers/RSS2016/pictures/pdf/IntroSwarmPic.pptx
@@ -3138,8 +3138,8 @@
         </p:nvSpPr>
         <p:spPr>
           <a:xfrm>
-            <a:off x="5851842" y="2331593"/>
-            <a:ext cx="3124651" cy="1569660"/>
+            <a:off x="5922806" y="1796537"/>
+            <a:ext cx="3124651" cy="1938992"/>
           </a:xfrm>
           <a:prstGeom prst="rect">
             <a:avLst/>
@@ -3168,12 +3168,26 @@
           <a:p>
             <a:pPr algn="ctr"/>
             <a:r>
+              <a:rPr lang="en-US" sz="2400" dirty="0">
+                <a:latin typeface="Times New Roman"/>
+                <a:cs typeface="Times New Roman"/>
+              </a:rPr>
+              <a:t>s</a:t>
+            </a:r>
+            <a:r>
               <a:rPr lang="en-US" sz="2400" dirty="0" smtClean="0">
                 <a:latin typeface="Times New Roman"/>
                 <a:cs typeface="Times New Roman"/>
               </a:rPr>
-              <a:t>sources</a:t>
-            </a:r>
+              <a:t>ources</a:t>
+            </a:r>
+          </a:p>
+          <a:p>
+            <a:pPr algn="ctr"/>
+            <a:endParaRPr lang="en-US" sz="2400" dirty="0" smtClean="0">
+              <a:latin typeface="Times New Roman"/>
+              <a:cs typeface="Times New Roman"/>
+            </a:endParaRPr>
           </a:p>
           <a:p>
             <a:pPr algn="ctr"/>
@@ -5358,6 +5372,366 @@
           </p:grpSp>
         </p:grpSp>
       </p:grpSp>
+      <p:grpSp>
+        <p:nvGrpSpPr>
+          <p:cNvPr id="8" name="Group 7"/>
+          <p:cNvGrpSpPr/>
+          <p:nvPr/>
+        </p:nvGrpSpPr>
+        <p:grpSpPr>
+          <a:xfrm>
+            <a:off x="8475066" y="2023647"/>
+            <a:ext cx="77535" cy="1348280"/>
+            <a:chOff x="8475066" y="2023647"/>
+            <a:chExt cx="77535" cy="1348280"/>
+          </a:xfrm>
+        </p:grpSpPr>
+        <p:sp>
+          <p:nvSpPr>
+            <p:cNvPr id="6" name="Rectangle 5"/>
+            <p:cNvSpPr/>
+            <p:nvPr/>
+          </p:nvSpPr>
+          <p:spPr>
+            <a:xfrm>
+              <a:off x="8475066" y="2023647"/>
+              <a:ext cx="77535" cy="319345"/>
+            </a:xfrm>
+            <a:prstGeom prst="rect">
+              <a:avLst/>
+            </a:prstGeom>
+            <a:solidFill>
+              <a:srgbClr val="FFFF00"/>
+            </a:solidFill>
+            <a:ln>
+              <a:noFill/>
+            </a:ln>
+            <a:effectLst/>
+          </p:spPr>
+          <p:style>
+            <a:lnRef idx="1">
+              <a:schemeClr val="accent1"/>
+            </a:lnRef>
+            <a:fillRef idx="3">
+              <a:schemeClr val="accent1"/>
+            </a:fillRef>
+            <a:effectRef idx="2">
+              <a:schemeClr val="accent1"/>
+            </a:effectRef>
+            <a:fontRef idx="minor">
+              <a:schemeClr val="lt1"/>
+            </a:fontRef>
+          </p:style>
+          <p:txBody>
+            <a:bodyPr rtlCol="0" anchor="ctr"/>
+            <a:lstStyle/>
+            <a:p>
+              <a:pPr algn="ctr"/>
+              <a:endParaRPr lang="en-US"/>
+            </a:p>
+          </p:txBody>
+        </p:sp>
+        <p:sp>
+          <p:nvSpPr>
+            <p:cNvPr id="91" name="Rectangle 90"/>
+            <p:cNvSpPr/>
+            <p:nvPr/>
+          </p:nvSpPr>
+          <p:spPr>
+            <a:xfrm>
+              <a:off x="8475066" y="3052582"/>
+              <a:ext cx="77535" cy="319345"/>
+            </a:xfrm>
+            <a:prstGeom prst="rect">
+              <a:avLst/>
+            </a:prstGeom>
+            <a:solidFill>
+              <a:srgbClr val="FFFF00"/>
+            </a:solidFill>
+            <a:ln>
+              <a:noFill/>
+            </a:ln>
+            <a:effectLst/>
+          </p:spPr>
+          <p:style>
+            <a:lnRef idx="1">
+              <a:schemeClr val="accent1"/>
+            </a:lnRef>
+            <a:fillRef idx="3">
+              <a:schemeClr val="accent1"/>
+            </a:fillRef>
+            <a:effectRef idx="2">
+              <a:schemeClr val="accent1"/>
+            </a:effectRef>
+            <a:fontRef idx="minor">
+              <a:schemeClr val="lt1"/>
+            </a:fontRef>
+          </p:style>
+          <p:txBody>
+            <a:bodyPr rtlCol="0" anchor="ctr"/>
+            <a:lstStyle/>
+            <a:p>
+              <a:pPr algn="ctr"/>
+              <a:endParaRPr lang="en-US"/>
+            </a:p>
+          </p:txBody>
+        </p:sp>
+      </p:grpSp>
+      <p:grpSp>
+        <p:nvGrpSpPr>
+          <p:cNvPr id="92" name="Group 91"/>
+          <p:cNvGrpSpPr/>
+          <p:nvPr/>
+        </p:nvGrpSpPr>
+        <p:grpSpPr>
+          <a:xfrm rot="18900000">
+            <a:off x="8453769" y="2065731"/>
+            <a:ext cx="77535" cy="1348280"/>
+            <a:chOff x="8475066" y="2023647"/>
+            <a:chExt cx="77535" cy="1348280"/>
+          </a:xfrm>
+        </p:grpSpPr>
+        <p:sp>
+          <p:nvSpPr>
+            <p:cNvPr id="93" name="Rectangle 92"/>
+            <p:cNvSpPr/>
+            <p:nvPr/>
+          </p:nvSpPr>
+          <p:spPr>
+            <a:xfrm>
+              <a:off x="8475066" y="2023647"/>
+              <a:ext cx="77535" cy="319345"/>
+            </a:xfrm>
+            <a:prstGeom prst="rect">
+              <a:avLst/>
+            </a:prstGeom>
+            <a:solidFill>
+              <a:srgbClr val="FFFF00"/>
+            </a:solidFill>
+            <a:ln>
+              <a:noFill/>
+            </a:ln>
+            <a:effectLst/>
+          </p:spPr>
+          <p:style>
+            <a:lnRef idx="1">
+              <a:schemeClr val="accent1"/>
+            </a:lnRef>
+            <a:fillRef idx="3">
+              <a:schemeClr val="accent1"/>
+            </a:fillRef>
+            <a:effectRef idx="2">
+              <a:schemeClr val="accent1"/>
+            </a:effectRef>
+            <a:fontRef idx="minor">
+              <a:schemeClr val="lt1"/>
+            </a:fontRef>
+          </p:style>
+          <p:txBody>
+            <a:bodyPr rtlCol="0" anchor="ctr"/>
+            <a:lstStyle/>
+            <a:p>
+              <a:pPr algn="ctr"/>
+              <a:endParaRPr lang="en-US"/>
+            </a:p>
+          </p:txBody>
+        </p:sp>
+        <p:sp>
+          <p:nvSpPr>
+            <p:cNvPr id="94" name="Rectangle 93"/>
+            <p:cNvSpPr/>
+            <p:nvPr/>
+          </p:nvSpPr>
+          <p:spPr>
+            <a:xfrm>
+              <a:off x="8475066" y="3052582"/>
+              <a:ext cx="77535" cy="319345"/>
+            </a:xfrm>
+            <a:prstGeom prst="rect">
+              <a:avLst/>
+            </a:prstGeom>
+            <a:solidFill>
+              <a:srgbClr val="FFFF00"/>
+            </a:solidFill>
+            <a:ln>
+              <a:noFill/>
+            </a:ln>
+            <a:effectLst/>
+          </p:spPr>
+          <p:style>
+            <a:lnRef idx="1">
+              <a:schemeClr val="accent1"/>
+            </a:lnRef>
+            <a:fillRef idx="3">
+              <a:schemeClr val="accent1"/>
+            </a:fillRef>
+            <a:effectRef idx="2">
+              <a:schemeClr val="accent1"/>
+            </a:effectRef>
+            <a:fontRef idx="minor">
+              <a:schemeClr val="lt1"/>
+            </a:fontRef>
+          </p:style>
+          <p:txBody>
+            <a:bodyPr rtlCol="0" anchor="ctr"/>
+            <a:lstStyle/>
+            <a:p>
+              <a:pPr algn="ctr"/>
+              <a:endParaRPr lang="en-US"/>
+            </a:p>
+          </p:txBody>
+        </p:sp>
+      </p:grpSp>
+      <p:grpSp>
+        <p:nvGrpSpPr>
+          <p:cNvPr id="95" name="Group 94"/>
+          <p:cNvGrpSpPr/>
+          <p:nvPr/>
+        </p:nvGrpSpPr>
+        <p:grpSpPr>
+          <a:xfrm rot="13500000">
+            <a:off x="8433624" y="2004263"/>
+            <a:ext cx="77535" cy="1348280"/>
+            <a:chOff x="8475066" y="2023647"/>
+            <a:chExt cx="77535" cy="1348280"/>
+          </a:xfrm>
+        </p:grpSpPr>
+        <p:sp>
+          <p:nvSpPr>
+            <p:cNvPr id="96" name="Rectangle 95"/>
+            <p:cNvSpPr/>
+            <p:nvPr/>
+          </p:nvSpPr>
+          <p:spPr>
+            <a:xfrm>
+              <a:off x="8475066" y="2023647"/>
+              <a:ext cx="77535" cy="319345"/>
+            </a:xfrm>
+            <a:prstGeom prst="rect">
+              <a:avLst/>
+            </a:prstGeom>
+            <a:solidFill>
+              <a:srgbClr val="FFFF00"/>
+            </a:solidFill>
+            <a:ln>
+              <a:noFill/>
+            </a:ln>
+            <a:effectLst/>
+          </p:spPr>
+          <p:style>
+            <a:lnRef idx="1">
+              <a:schemeClr val="accent1"/>
+            </a:lnRef>
+            <a:fillRef idx="3">
+              <a:schemeClr val="accent1"/>
+            </a:fillRef>
+            <a:effectRef idx="2">
+              <a:schemeClr val="accent1"/>
+            </a:effectRef>
+            <a:fontRef idx="minor">
+              <a:schemeClr val="lt1"/>
+            </a:fontRef>
+          </p:style>
+          <p:txBody>
+            <a:bodyPr rtlCol="0" anchor="ctr"/>
+            <a:lstStyle/>
+            <a:p>
+              <a:pPr algn="ctr"/>
+              <a:endParaRPr lang="en-US"/>
+            </a:p>
+          </p:txBody>
+        </p:sp>
+        <p:sp>
+          <p:nvSpPr>
+            <p:cNvPr id="97" name="Rectangle 96"/>
+            <p:cNvSpPr/>
+            <p:nvPr/>
+          </p:nvSpPr>
+          <p:spPr>
+            <a:xfrm>
+              <a:off x="8475066" y="3052582"/>
+              <a:ext cx="77535" cy="319345"/>
+            </a:xfrm>
+            <a:prstGeom prst="rect">
+              <a:avLst/>
+            </a:prstGeom>
+            <a:solidFill>
+              <a:srgbClr val="FFFF00"/>
+            </a:solidFill>
+            <a:ln>
+              <a:noFill/>
+            </a:ln>
+            <a:effectLst/>
+          </p:spPr>
+          <p:style>
+            <a:lnRef idx="1">
+              <a:schemeClr val="accent1"/>
+            </a:lnRef>
+            <a:fillRef idx="3">
+              <a:schemeClr val="accent1"/>
+            </a:fillRef>
+            <a:effectRef idx="2">
+              <a:schemeClr val="accent1"/>
+            </a:effectRef>
+            <a:fontRef idx="minor">
+              <a:schemeClr val="lt1"/>
+            </a:fontRef>
+          </p:style>
+          <p:txBody>
+            <a:bodyPr rtlCol="0" anchor="ctr"/>
+            <a:lstStyle/>
+            <a:p>
+              <a:pPr algn="ctr"/>
+              <a:endParaRPr lang="en-US"/>
+            </a:p>
+          </p:txBody>
+        </p:sp>
+      </p:grpSp>
+      <p:sp>
+        <p:nvSpPr>
+          <p:cNvPr id="98" name="Rectangle 97"/>
+          <p:cNvSpPr/>
+          <p:nvPr/>
+        </p:nvSpPr>
+        <p:spPr>
+          <a:xfrm rot="16200000">
+            <a:off x="7918594" y="2547458"/>
+            <a:ext cx="77535" cy="319345"/>
+          </a:xfrm>
+          <a:prstGeom prst="rect">
+            <a:avLst/>
+          </a:prstGeom>
+          <a:solidFill>
+            <a:srgbClr val="FFFF00"/>
+          </a:solidFill>
+          <a:ln>
+            <a:noFill/>
+          </a:ln>
+          <a:effectLst/>
+        </p:spPr>
+        <p:style>
+          <a:lnRef idx="1">
+            <a:schemeClr val="accent1"/>
+          </a:lnRef>
+          <a:fillRef idx="3">
+            <a:schemeClr val="accent1"/>
+          </a:fillRef>
+          <a:effectRef idx="2">
+            <a:schemeClr val="accent1"/>
+          </a:effectRef>
+          <a:fontRef idx="minor">
+            <a:schemeClr val="lt1"/>
+          </a:fontRef>
+        </p:style>
+        <p:txBody>
+          <a:bodyPr rtlCol="0" anchor="ctr"/>
+          <a:lstStyle/>
+          <a:p>
+            <a:pPr algn="ctr"/>
+            <a:endParaRPr lang="en-US"/>
+          </a:p>
+        </p:txBody>
+      </p:sp>
     </p:spTree>
     <p:extLst>
       <p:ext uri="{BB962C8B-B14F-4D97-AF65-F5344CB8AC3E}">

</xml_diff>